<commit_message>
Probleme von Dozier in PPT eingetragen
</commit_message>
<xml_diff>
--- a/presentation.pptx
+++ b/presentation.pptx
@@ -46,7 +46,7 @@
   <p:sldSz cx="9144000" cy="6858000" type="screen4x3"/>
   <p:notesSz cx="6858000" cy="9144000"/>
   <p:custDataLst>
-    <p:tags r:id="rId35"/>
+    <p:tags r:id="rId36"/>
   </p:custDataLst>
   <p:defaultTextStyle>
     <a:defPPr>
@@ -319,7 +319,7 @@
             <a:fld id="{24523C93-84C8-404C-9343-A87C958A5467}" type="datetimeFigureOut">
               <a:rPr lang="de-DE" smtClean="0"/>
               <a:pPr/>
-              <a:t>29.04.2014</a:t>
+              <a:t>08.06.14</a:t>
             </a:fld>
             <a:endParaRPr lang="de-DE" dirty="0"/>
           </a:p>
@@ -733,7 +733,7 @@
             <a:fld id="{24523C93-84C8-404C-9343-A87C958A5467}" type="datetimeFigureOut">
               <a:rPr lang="de-DE" smtClean="0"/>
               <a:pPr/>
-              <a:t>29.04.2014</a:t>
+              <a:t>08.06.14</a:t>
             </a:fld>
             <a:endParaRPr lang="de-DE" dirty="0"/>
           </a:p>
@@ -1111,7 +1111,7 @@
             <a:fld id="{A83C954B-B8C8-419A-AADE-F78AC99DD3F8}" type="datetime1">
               <a:rPr lang="de-DE" smtClean="0"/>
               <a:pPr/>
-              <a:t>29.04.2014</a:t>
+              <a:t>08.06.14</a:t>
             </a:fld>
             <a:endParaRPr lang="de-DE" dirty="0"/>
           </a:p>
@@ -1241,7 +1241,7 @@
             <a:fld id="{D6C2D33A-5076-427B-AFA6-BD9E7A04C415}" type="datetime1">
               <a:rPr lang="de-DE" smtClean="0"/>
               <a:pPr/>
-              <a:t>29.04.2014</a:t>
+              <a:t>08.06.14</a:t>
             </a:fld>
             <a:endParaRPr lang="de-DE" dirty="0"/>
           </a:p>
@@ -1371,7 +1371,7 @@
             <a:fld id="{D6C2D33A-5076-427B-AFA6-BD9E7A04C415}" type="datetime1">
               <a:rPr lang="de-DE" smtClean="0"/>
               <a:pPr/>
-              <a:t>29.04.2014</a:t>
+              <a:t>08.06.14</a:t>
             </a:fld>
             <a:endParaRPr lang="de-DE" dirty="0"/>
           </a:p>
@@ -1791,7 +1791,7 @@
           <a:p>
             <a:fld id="{6AC350D3-0AEB-4393-8A29-FFC355146385}" type="datetime1">
               <a:rPr lang="de-DE" smtClean="0"/>
-              <a:t>29.04.2014</a:t>
+              <a:t>08.06.14</a:t>
             </a:fld>
             <a:endParaRPr lang="de-DE" dirty="0"/>
           </a:p>
@@ -1926,7 +1926,7 @@
             <a:fld id="{D6C2D33A-5076-427B-AFA6-BD9E7A04C415}" type="datetime1">
               <a:rPr lang="de-DE" smtClean="0"/>
               <a:pPr/>
-              <a:t>29.04.2014</a:t>
+              <a:t>08.06.14</a:t>
             </a:fld>
             <a:endParaRPr lang="de-DE" dirty="0"/>
           </a:p>
@@ -2056,7 +2056,7 @@
             <a:fld id="{D6C2D33A-5076-427B-AFA6-BD9E7A04C415}" type="datetime1">
               <a:rPr lang="de-DE" smtClean="0"/>
               <a:pPr/>
-              <a:t>29.04.2014</a:t>
+              <a:t>08.06.14</a:t>
             </a:fld>
             <a:endParaRPr lang="de-DE" dirty="0"/>
           </a:p>
@@ -2186,7 +2186,7 @@
             <a:fld id="{D6C2D33A-5076-427B-AFA6-BD9E7A04C415}" type="datetime1">
               <a:rPr lang="de-DE" smtClean="0"/>
               <a:pPr/>
-              <a:t>29.04.2014</a:t>
+              <a:t>08.06.14</a:t>
             </a:fld>
             <a:endParaRPr lang="de-DE" dirty="0"/>
           </a:p>
@@ -2316,7 +2316,7 @@
             <a:fld id="{D6C2D33A-5076-427B-AFA6-BD9E7A04C415}" type="datetime1">
               <a:rPr lang="de-DE" smtClean="0"/>
               <a:pPr/>
-              <a:t>29.04.2014</a:t>
+              <a:t>08.06.14</a:t>
             </a:fld>
             <a:endParaRPr lang="de-DE" dirty="0"/>
           </a:p>
@@ -2446,7 +2446,7 @@
             <a:fld id="{D6C2D33A-5076-427B-AFA6-BD9E7A04C415}" type="datetime1">
               <a:rPr lang="de-DE" smtClean="0"/>
               <a:pPr/>
-              <a:t>29.04.2014</a:t>
+              <a:t>08.06.14</a:t>
             </a:fld>
             <a:endParaRPr lang="de-DE" dirty="0"/>
           </a:p>
@@ -2576,7 +2576,7 @@
             <a:fld id="{D6C2D33A-5076-427B-AFA6-BD9E7A04C415}" type="datetime1">
               <a:rPr lang="de-DE" smtClean="0"/>
               <a:pPr/>
-              <a:t>29.04.2014</a:t>
+              <a:t>08.06.14</a:t>
             </a:fld>
             <a:endParaRPr lang="de-DE" dirty="0"/>
           </a:p>
@@ -2675,7 +2675,7 @@
           <a:graphicData uri="http://schemas.openxmlformats.org/presentationml/2006/ole">
             <mc:AlternateContent xmlns:mc="http://schemas.openxmlformats.org/markup-compatibility/2006">
               <mc:Choice xmlns:v="urn:schemas-microsoft-com:vml" Requires="v">
-                <p:oleObj spid="_x0000_s2136" name="think-cell Slide" r:id="rId7" imgW="270" imgH="270" progId="TCLayout.ActiveDocument.1">
+                <p:oleObj spid="_x0000_s2140" name="think-cell Slide" r:id="rId7" imgW="270" imgH="270" progId="TCLayout.ActiveDocument.1">
                   <p:embed/>
                 </p:oleObj>
               </mc:Choice>
@@ -2713,7 +2713,7 @@
                       </a:prstGeom>
                       <a:noFill/>
                       <a:extLst>
-                        <a:ext uri="{909E8E84-426E-40DD-AFC4-6F175D3DCCD1}">
+                        <a:ext uri="{909E8E84-426E-40dd-AFC4-6F175D3DCCD1}">
                           <a14:hiddenFill xmlns:a14="http://schemas.microsoft.com/office/drawing/2010/main">
                             <a:solidFill>
                               <a:srgbClr val="FFFFFF"/>
@@ -3160,7 +3160,7 @@
           </a:prstGeom>
           <a:noFill/>
           <a:extLst>
-            <a:ext uri="{909E8E84-426E-40DD-AFC4-6F175D3DCCD1}">
+            <a:ext uri="{909E8E84-426E-40dd-AFC4-6F175D3DCCD1}">
               <a14:hiddenFill xmlns:a14="http://schemas.microsoft.com/office/drawing/2010/main">
                 <a:solidFill>
                   <a:srgbClr val="FFFFFF"/>
@@ -3180,13 +3180,13 @@
   <p:clrMapOvr>
     <a:masterClrMapping/>
   </p:clrMapOvr>
-  <p:transition>
+  <p:transition xmlns:p14="http://schemas.microsoft.com/office/powerpoint/2010/main">
     <p:fade/>
   </p:transition>
   <p:timing>
     <p:tnLst>
       <p:par>
-        <p:cTn id="1" dur="indefinite" restart="never" nodeType="tmRoot"/>
+        <p:cTn xmlns:p14="http://schemas.microsoft.com/office/powerpoint/2010/main" id="1" dur="indefinite" restart="never" nodeType="tmRoot"/>
       </p:par>
     </p:tnLst>
   </p:timing>
@@ -3415,7 +3415,7 @@
           <a:p>
             <a:fld id="{8691AD34-C472-4D64-846F-8B487AA14261}" type="datetime1">
               <a:rPr lang="de-DE" smtClean="0"/>
-              <a:t>29.04.2014</a:t>
+              <a:t>08.06.14</a:t>
             </a:fld>
             <a:endParaRPr lang="de-DE" dirty="0"/>
           </a:p>
@@ -3482,13 +3482,13 @@
   <p:clrMapOvr>
     <a:masterClrMapping/>
   </p:clrMapOvr>
-  <p:transition>
+  <p:transition xmlns:p14="http://schemas.microsoft.com/office/powerpoint/2010/main">
     <p:fade/>
   </p:transition>
   <p:timing>
     <p:tnLst>
       <p:par>
-        <p:cTn id="1" dur="indefinite" restart="never" nodeType="tmRoot"/>
+        <p:cTn xmlns:p14="http://schemas.microsoft.com/office/powerpoint/2010/main" id="1" dur="indefinite" restart="never" nodeType="tmRoot"/>
       </p:par>
     </p:tnLst>
   </p:timing>
@@ -3694,7 +3694,7 @@
           <a:p>
             <a:fld id="{ED30F227-7979-4D82-A51B-D6ECC99FEF80}" type="datetime1">
               <a:rPr lang="de-DE" smtClean="0"/>
-              <a:t>29.04.2014</a:t>
+              <a:t>08.06.14</a:t>
             </a:fld>
             <a:endParaRPr lang="de-DE" dirty="0"/>
           </a:p>
@@ -3775,13 +3775,13 @@
   <p:clrMapOvr>
     <a:masterClrMapping/>
   </p:clrMapOvr>
-  <p:transition>
+  <p:transition xmlns:p14="http://schemas.microsoft.com/office/powerpoint/2010/main">
     <p:fade/>
   </p:transition>
   <p:timing>
     <p:tnLst>
       <p:par>
-        <p:cTn id="1" dur="indefinite" restart="never" nodeType="tmRoot"/>
+        <p:cTn xmlns:p14="http://schemas.microsoft.com/office/powerpoint/2010/main" id="1" dur="indefinite" restart="never" nodeType="tmRoot"/>
       </p:par>
     </p:tnLst>
   </p:timing>
@@ -3917,7 +3917,7 @@
           <a:p>
             <a:fld id="{3FF3C783-8EE4-4E46-9A80-813386CFF9DD}" type="datetime1">
               <a:rPr lang="de-DE" smtClean="0"/>
-              <a:t>29.04.2014</a:t>
+              <a:t>08.06.14</a:t>
             </a:fld>
             <a:endParaRPr lang="de-DE" dirty="0"/>
           </a:p>
@@ -3998,13 +3998,13 @@
   <p:clrMapOvr>
     <a:masterClrMapping/>
   </p:clrMapOvr>
-  <p:transition>
+  <p:transition xmlns:p14="http://schemas.microsoft.com/office/powerpoint/2010/main">
     <p:fade/>
   </p:transition>
   <p:timing>
     <p:tnLst>
       <p:par>
-        <p:cTn id="1" dur="indefinite" restart="never" nodeType="tmRoot"/>
+        <p:cTn xmlns:p14="http://schemas.microsoft.com/office/powerpoint/2010/main" id="1" dur="indefinite" restart="never" nodeType="tmRoot"/>
       </p:par>
     </p:tnLst>
   </p:timing>
@@ -4152,7 +4152,7 @@
           <a:p>
             <a:fld id="{0480C303-BA93-4835-A165-8E867B3CF3F6}" type="datetime1">
               <a:rPr lang="de-DE" smtClean="0"/>
-              <a:t>29.04.2014</a:t>
+              <a:t>08.06.14</a:t>
             </a:fld>
             <a:endParaRPr lang="de-DE" dirty="0"/>
           </a:p>
@@ -5264,13 +5264,13 @@
   <p:clrMapOvr>
     <a:masterClrMapping/>
   </p:clrMapOvr>
-  <p:transition>
+  <p:transition xmlns:p14="http://schemas.microsoft.com/office/powerpoint/2010/main">
     <p:fade/>
   </p:transition>
   <p:timing>
     <p:tnLst>
       <p:par>
-        <p:cTn id="1" dur="indefinite" restart="never" nodeType="tmRoot"/>
+        <p:cTn xmlns:p14="http://schemas.microsoft.com/office/powerpoint/2010/main" id="1" dur="indefinite" restart="never" nodeType="tmRoot"/>
       </p:par>
     </p:tnLst>
   </p:timing>
@@ -5314,7 +5314,7 @@
           <a:graphicData uri="http://schemas.openxmlformats.org/presentationml/2006/ole">
             <mc:AlternateContent xmlns:mc="http://schemas.openxmlformats.org/markup-compatibility/2006">
               <mc:Choice xmlns:v="urn:schemas-microsoft-com:vml" Requires="v">
-                <p:oleObj spid="_x0000_s3150" name="think-cell Slide" r:id="rId6" imgW="270" imgH="270" progId="TCLayout.ActiveDocument.1">
+                <p:oleObj spid="_x0000_s3154" name="think-cell Slide" r:id="rId6" imgW="270" imgH="270" progId="TCLayout.ActiveDocument.1">
                   <p:embed/>
                 </p:oleObj>
               </mc:Choice>
@@ -5352,7 +5352,7 @@
                       </a:prstGeom>
                       <a:noFill/>
                       <a:extLst>
-                        <a:ext uri="{909E8E84-426E-40DD-AFC4-6F175D3DCCD1}">
+                        <a:ext uri="{909E8E84-426E-40dd-AFC4-6F175D3DCCD1}">
                           <a14:hiddenFill xmlns:a14="http://schemas.microsoft.com/office/drawing/2010/main">
                             <a:solidFill>
                               <a:srgbClr val="FFFFFF"/>
@@ -5843,7 +5843,7 @@
           </a:prstGeom>
           <a:noFill/>
           <a:extLst>
-            <a:ext uri="{909E8E84-426E-40DD-AFC4-6F175D3DCCD1}">
+            <a:ext uri="{909E8E84-426E-40dd-AFC4-6F175D3DCCD1}">
               <a14:hiddenFill xmlns:a14="http://schemas.microsoft.com/office/drawing/2010/main">
                 <a:solidFill>
                   <a:srgbClr val="FFFFFF"/>
@@ -5870,7 +5870,7 @@
           <a:p>
             <a:fld id="{356AAF10-A9A0-4D23-A804-9F7531110564}" type="datetime1">
               <a:rPr lang="de-DE" smtClean="0"/>
-              <a:t>29.04.2014</a:t>
+              <a:t>08.06.14</a:t>
             </a:fld>
             <a:endParaRPr lang="de-DE" dirty="0"/>
           </a:p>
@@ -5937,13 +5937,13 @@
   <p:clrMapOvr>
     <a:masterClrMapping/>
   </p:clrMapOvr>
-  <p:transition>
+  <p:transition xmlns:p14="http://schemas.microsoft.com/office/powerpoint/2010/main">
     <p:fade/>
   </p:transition>
   <p:timing>
     <p:tnLst>
       <p:par>
-        <p:cTn id="1" dur="indefinite" restart="never" nodeType="tmRoot"/>
+        <p:cTn xmlns:p14="http://schemas.microsoft.com/office/powerpoint/2010/main" id="1" dur="indefinite" restart="never" nodeType="tmRoot"/>
       </p:par>
     </p:tnLst>
   </p:timing>
@@ -5987,7 +5987,7 @@
           <a:graphicData uri="http://schemas.openxmlformats.org/presentationml/2006/ole">
             <mc:AlternateContent xmlns:mc="http://schemas.openxmlformats.org/markup-compatibility/2006">
               <mc:Choice xmlns:v="urn:schemas-microsoft-com:vml" Requires="v">
-                <p:oleObj spid="_x0000_s4172" name="think-cell Slide" r:id="rId7" imgW="270" imgH="270" progId="TCLayout.ActiveDocument.1">
+                <p:oleObj spid="_x0000_s4176" name="think-cell Slide" r:id="rId7" imgW="270" imgH="270" progId="TCLayout.ActiveDocument.1">
                   <p:embed/>
                 </p:oleObj>
               </mc:Choice>
@@ -6025,7 +6025,7 @@
                       </a:prstGeom>
                       <a:noFill/>
                       <a:extLst>
-                        <a:ext uri="{909E8E84-426E-40DD-AFC4-6F175D3DCCD1}">
+                        <a:ext uri="{909E8E84-426E-40dd-AFC4-6F175D3DCCD1}">
                           <a14:hiddenFill xmlns:a14="http://schemas.microsoft.com/office/drawing/2010/main">
                             <a:solidFill>
                               <a:srgbClr val="FFFFFF"/>
@@ -6319,7 +6319,7 @@
           <a:p>
             <a:fld id="{1F13FBBC-8722-4D8C-891E-A8BCF7E2DD9A}" type="datetime1">
               <a:rPr lang="de-DE" smtClean="0"/>
-              <a:t>29.04.2014</a:t>
+              <a:t>08.06.14</a:t>
             </a:fld>
             <a:endParaRPr lang="de-DE" dirty="0"/>
           </a:p>
@@ -6382,13 +6382,13 @@
   <p:clrMapOvr>
     <a:masterClrMapping/>
   </p:clrMapOvr>
-  <p:transition>
+  <p:transition xmlns:p14="http://schemas.microsoft.com/office/powerpoint/2010/main">
     <p:fade/>
   </p:transition>
   <p:timing>
     <p:tnLst>
       <p:par>
-        <p:cTn id="1" dur="indefinite" restart="never" nodeType="tmRoot"/>
+        <p:cTn xmlns:p14="http://schemas.microsoft.com/office/powerpoint/2010/main" id="1" dur="indefinite" restart="never" nodeType="tmRoot"/>
       </p:par>
     </p:tnLst>
   </p:timing>
@@ -6690,7 +6690,7 @@
           <a:p>
             <a:fld id="{9B55D62D-7FBE-4C67-9194-E2B7522AB6A0}" type="datetime1">
               <a:rPr lang="de-DE" smtClean="0"/>
-              <a:t>29.04.2014</a:t>
+              <a:t>08.06.14</a:t>
             </a:fld>
             <a:endParaRPr lang="de-DE" dirty="0"/>
           </a:p>
@@ -6753,13 +6753,13 @@
   <p:clrMapOvr>
     <a:masterClrMapping/>
   </p:clrMapOvr>
-  <p:transition>
+  <p:transition xmlns:p14="http://schemas.microsoft.com/office/powerpoint/2010/main">
     <p:fade/>
   </p:transition>
   <p:timing>
     <p:tnLst>
       <p:par>
-        <p:cTn id="1" dur="indefinite" restart="never" nodeType="tmRoot"/>
+        <p:cTn xmlns:p14="http://schemas.microsoft.com/office/powerpoint/2010/main" id="1" dur="indefinite" restart="never" nodeType="tmRoot"/>
       </p:par>
     </p:tnLst>
   </p:timing>
@@ -7102,7 +7102,7 @@
           <a:p>
             <a:fld id="{605748B9-88C4-4816-A272-8F2AD59942F5}" type="datetime1">
               <a:rPr lang="de-DE" smtClean="0"/>
-              <a:t>29.04.2014</a:t>
+              <a:t>08.06.14</a:t>
             </a:fld>
             <a:endParaRPr lang="de-DE" dirty="0"/>
           </a:p>
@@ -7165,13 +7165,13 @@
   <p:clrMapOvr>
     <a:masterClrMapping/>
   </p:clrMapOvr>
-  <p:transition>
+  <p:transition xmlns:p14="http://schemas.microsoft.com/office/powerpoint/2010/main">
     <p:fade/>
   </p:transition>
   <p:timing>
     <p:tnLst>
       <p:par>
-        <p:cTn id="1" dur="indefinite" restart="never" nodeType="tmRoot"/>
+        <p:cTn xmlns:p14="http://schemas.microsoft.com/office/powerpoint/2010/main" id="1" dur="indefinite" restart="never" nodeType="tmRoot"/>
       </p:par>
     </p:tnLst>
   </p:timing>
@@ -7514,7 +7514,7 @@
           <a:p>
             <a:fld id="{EA880631-A619-468F-8150-6BBC68E05E60}" type="datetime1">
               <a:rPr lang="de-DE" smtClean="0"/>
-              <a:t>29.04.2014</a:t>
+              <a:t>08.06.14</a:t>
             </a:fld>
             <a:endParaRPr lang="de-DE" dirty="0"/>
           </a:p>
@@ -7577,13 +7577,13 @@
   <p:clrMapOvr>
     <a:masterClrMapping/>
   </p:clrMapOvr>
-  <p:transition>
+  <p:transition xmlns:p14="http://schemas.microsoft.com/office/powerpoint/2010/main">
     <p:fade/>
   </p:transition>
   <p:timing>
     <p:tnLst>
       <p:par>
-        <p:cTn id="1" dur="indefinite" restart="never" nodeType="tmRoot"/>
+        <p:cTn xmlns:p14="http://schemas.microsoft.com/office/powerpoint/2010/main" id="1" dur="indefinite" restart="never" nodeType="tmRoot"/>
       </p:par>
     </p:tnLst>
   </p:timing>
@@ -8040,7 +8040,7 @@
           <a:p>
             <a:fld id="{A7B8CD47-D41E-4B60-A93C-3B8A1E32031C}" type="datetime1">
               <a:rPr lang="de-DE" smtClean="0"/>
-              <a:t>29.04.2014</a:t>
+              <a:t>08.06.14</a:t>
             </a:fld>
             <a:endParaRPr lang="de-DE" dirty="0"/>
           </a:p>
@@ -8103,13 +8103,13 @@
   <p:clrMapOvr>
     <a:masterClrMapping/>
   </p:clrMapOvr>
-  <p:transition>
+  <p:transition xmlns:p14="http://schemas.microsoft.com/office/powerpoint/2010/main">
     <p:fade/>
   </p:transition>
   <p:timing>
     <p:tnLst>
       <p:par>
-        <p:cTn id="1" dur="indefinite" restart="never" nodeType="tmRoot"/>
+        <p:cTn xmlns:p14="http://schemas.microsoft.com/office/powerpoint/2010/main" id="1" dur="indefinite" restart="never" nodeType="tmRoot"/>
       </p:par>
     </p:tnLst>
   </p:timing>
@@ -8452,7 +8452,7 @@
           <a:p>
             <a:fld id="{B2643510-3B0C-43FA-A71D-6291D3BE084C}" type="datetime1">
               <a:rPr lang="de-DE" smtClean="0"/>
-              <a:t>29.04.2014</a:t>
+              <a:t>08.06.14</a:t>
             </a:fld>
             <a:endParaRPr lang="de-DE" dirty="0"/>
           </a:p>
@@ -8515,13 +8515,13 @@
   <p:clrMapOvr>
     <a:masterClrMapping/>
   </p:clrMapOvr>
-  <p:transition>
+  <p:transition xmlns:p14="http://schemas.microsoft.com/office/powerpoint/2010/main">
     <p:fade/>
   </p:transition>
   <p:timing>
     <p:tnLst>
       <p:par>
-        <p:cTn id="1" dur="indefinite" restart="never" nodeType="tmRoot"/>
+        <p:cTn xmlns:p14="http://schemas.microsoft.com/office/powerpoint/2010/main" id="1" dur="indefinite" restart="never" nodeType="tmRoot"/>
       </p:par>
     </p:tnLst>
   </p:timing>
@@ -8807,7 +8807,7 @@
           <a:p>
             <a:fld id="{CD8E4B05-8DF8-4C35-9AD7-17821B4794AA}" type="datetime1">
               <a:rPr lang="de-DE" smtClean="0"/>
-              <a:t>29.04.2014</a:t>
+              <a:t>08.06.14</a:t>
             </a:fld>
             <a:endParaRPr lang="de-DE" dirty="0"/>
           </a:p>
@@ -8870,13 +8870,13 @@
   <p:clrMapOvr>
     <a:masterClrMapping/>
   </p:clrMapOvr>
-  <p:transition>
+  <p:transition xmlns:p14="http://schemas.microsoft.com/office/powerpoint/2010/main">
     <p:fade/>
   </p:transition>
   <p:timing>
     <p:tnLst>
       <p:par>
-        <p:cTn id="1" dur="indefinite" restart="never" nodeType="tmRoot"/>
+        <p:cTn xmlns:p14="http://schemas.microsoft.com/office/powerpoint/2010/main" id="1" dur="indefinite" restart="never" nodeType="tmRoot"/>
       </p:par>
     </p:tnLst>
   </p:timing>
@@ -9204,7 +9204,7 @@
           <a:p>
             <a:fld id="{A7B8A89D-21FC-47B7-A13C-BEB7BC0CEE08}" type="datetime1">
               <a:rPr lang="de-DE" smtClean="0"/>
-              <a:t>29.04.2014</a:t>
+              <a:t>08.06.14</a:t>
             </a:fld>
             <a:endParaRPr lang="de-DE" dirty="0"/>
           </a:p>
@@ -9285,13 +9285,13 @@
   <p:clrMapOvr>
     <a:masterClrMapping/>
   </p:clrMapOvr>
-  <p:transition>
+  <p:transition xmlns:p14="http://schemas.microsoft.com/office/powerpoint/2010/main">
     <p:fade/>
   </p:transition>
   <p:timing>
     <p:tnLst>
       <p:par>
-        <p:cTn id="1" dur="indefinite" restart="never" nodeType="tmRoot"/>
+        <p:cTn xmlns:p14="http://schemas.microsoft.com/office/powerpoint/2010/main" id="1" dur="indefinite" restart="never" nodeType="tmRoot"/>
       </p:par>
     </p:tnLst>
   </p:timing>
@@ -9386,7 +9386,7 @@
           <a:graphicData uri="http://schemas.openxmlformats.org/presentationml/2006/ole">
             <mc:AlternateContent xmlns:mc="http://schemas.openxmlformats.org/markup-compatibility/2006">
               <mc:Choice xmlns:v="urn:schemas-microsoft-com:vml" Requires="v">
-                <p:oleObj spid="_x0000_s1119" name="think-cell Slide" r:id="rId24" imgW="270" imgH="270" progId="TCLayout.ActiveDocument.1">
+                <p:oleObj spid="_x0000_s1123" name="think-cell Slide" r:id="rId24" imgW="270" imgH="270" progId="TCLayout.ActiveDocument.1">
                   <p:embed/>
                 </p:oleObj>
               </mc:Choice>
@@ -9424,7 +9424,7 @@
                       </a:prstGeom>
                       <a:noFill/>
                       <a:extLst>
-                        <a:ext uri="{909E8E84-426E-40DD-AFC4-6F175D3DCCD1}">
+                        <a:ext uri="{909E8E84-426E-40dd-AFC4-6F175D3DCCD1}">
                           <a14:hiddenFill xmlns:a14="http://schemas.microsoft.com/office/drawing/2010/main">
                             <a:solidFill>
                               <a:srgbClr val="FFFFFF"/>
@@ -9673,7 +9673,7 @@
           <a:p>
             <a:fld id="{84FDEB67-925E-45B5-BD47-77FD69118CB4}" type="datetime1">
               <a:rPr lang="de-DE" smtClean="0"/>
-              <a:t>29.04.2014</a:t>
+              <a:t>08.06.14</a:t>
             </a:fld>
             <a:endParaRPr lang="de-DE" dirty="0"/>
           </a:p>
@@ -9894,7 +9894,7 @@
           </a:prstGeom>
           <a:noFill/>
           <a:extLst>
-            <a:ext uri="{909E8E84-426E-40DD-AFC4-6F175D3DCCD1}">
+            <a:ext uri="{909E8E84-426E-40dd-AFC4-6F175D3DCCD1}">
               <a14:hiddenFill xmlns:a14="http://schemas.microsoft.com/office/drawing/2010/main">
                 <a:solidFill>
                   <a:srgbClr val="FFFFFF"/>
@@ -9928,13 +9928,13 @@
     <p:sldLayoutId id="2147483674" r:id="rId13"/>
     <p:sldLayoutId id="2147483672" r:id="rId14"/>
   </p:sldLayoutIdLst>
-  <p:transition>
+  <p:transition xmlns:p14="http://schemas.microsoft.com/office/powerpoint/2010/main">
     <p:fade/>
   </p:transition>
   <p:timing>
     <p:tnLst>
       <p:par>
-        <p:cTn id="1" dur="indefinite" restart="never" nodeType="tmRoot"/>
+        <p:cTn xmlns:p14="http://schemas.microsoft.com/office/powerpoint/2010/main" id="1" dur="indefinite" restart="never" nodeType="tmRoot"/>
       </p:par>
     </p:tnLst>
   </p:timing>
@@ -10329,7 +10329,7 @@
             </a:r>
             <a:fld id="{926F3AC8-AE74-4ACF-8AA8-751610311A88}" type="datetime1">
               <a:rPr lang="de-DE" smtClean="0"/>
-              <a:t>29.04.2014</a:t>
+              <a:t>08.06.14</a:t>
             </a:fld>
             <a:endParaRPr lang="de-DE" dirty="0"/>
           </a:p>
@@ -10345,13 +10345,13 @@
   <p:clrMapOvr>
     <a:masterClrMapping/>
   </p:clrMapOvr>
-  <p:transition>
+  <p:transition xmlns:p14="http://schemas.microsoft.com/office/powerpoint/2010/main">
     <p:fade/>
   </p:transition>
   <p:timing>
     <p:tnLst>
       <p:par>
-        <p:cTn id="1" dur="indefinite" restart="never" nodeType="tmRoot"/>
+        <p:cTn xmlns:p14="http://schemas.microsoft.com/office/powerpoint/2010/main" id="1" dur="indefinite" restart="never" nodeType="tmRoot"/>
       </p:par>
     </p:tnLst>
   </p:timing>
@@ -10457,7 +10457,7 @@
           <a:p>
             <a:fld id="{E15B2380-E3B7-4FA1-AA00-CA1A3953547F}" type="datetime1">
               <a:rPr lang="de-DE" smtClean="0"/>
-              <a:t>29.04.2014</a:t>
+              <a:t>08.06.14</a:t>
             </a:fld>
             <a:endParaRPr lang="de-DE" dirty="0"/>
           </a:p>
@@ -10520,13 +10520,13 @@
   <p:clrMapOvr>
     <a:masterClrMapping/>
   </p:clrMapOvr>
-  <p:transition>
+  <p:transition xmlns:p14="http://schemas.microsoft.com/office/powerpoint/2010/main">
     <p:fade/>
   </p:transition>
   <p:timing>
     <p:tnLst>
       <p:par>
-        <p:cTn id="1" dur="indefinite" restart="never" nodeType="tmRoot"/>
+        <p:cTn xmlns:p14="http://schemas.microsoft.com/office/powerpoint/2010/main" id="1" dur="indefinite" restart="never" nodeType="tmRoot"/>
       </p:par>
     </p:tnLst>
   </p:timing>
@@ -10636,7 +10636,7 @@
           <a:p>
             <a:fld id="{9B55D62D-7FBE-4C67-9194-E2B7522AB6A0}" type="datetime1">
               <a:rPr lang="de-DE" smtClean="0"/>
-              <a:t>29.04.2014</a:t>
+              <a:t>08.06.14</a:t>
             </a:fld>
             <a:endParaRPr lang="de-DE" dirty="0"/>
           </a:p>
@@ -10699,13 +10699,13 @@
   <p:clrMapOvr>
     <a:masterClrMapping/>
   </p:clrMapOvr>
-  <p:transition>
+  <p:transition xmlns:p14="http://schemas.microsoft.com/office/powerpoint/2010/main">
     <p:fade/>
   </p:transition>
   <p:timing>
     <p:tnLst>
       <p:par>
-        <p:cTn id="1" dur="indefinite" restart="never" nodeType="tmRoot"/>
+        <p:cTn xmlns:p14="http://schemas.microsoft.com/office/powerpoint/2010/main" id="1" dur="indefinite" restart="never" nodeType="tmRoot"/>
       </p:par>
     </p:tnLst>
   </p:timing>
@@ -11378,7 +11378,7 @@
           <a:p>
             <a:fld id="{69D24BFC-A115-49FE-B58E-E49EBCCBC2B0}" type="datetime1">
               <a:rPr lang="de-DE" smtClean="0"/>
-              <a:t>29.04.2014</a:t>
+              <a:t>08.06.14</a:t>
             </a:fld>
             <a:endParaRPr lang="de-DE" dirty="0"/>
           </a:p>
@@ -13277,13 +13277,13 @@
   <p:clrMapOvr>
     <a:masterClrMapping/>
   </p:clrMapOvr>
-  <p:transition>
+  <p:transition xmlns:p14="http://schemas.microsoft.com/office/powerpoint/2010/main">
     <p:fade/>
   </p:transition>
   <p:timing>
     <p:tnLst>
       <p:par>
-        <p:cTn id="1" dur="indefinite" restart="never" nodeType="tmRoot"/>
+        <p:cTn xmlns:p14="http://schemas.microsoft.com/office/powerpoint/2010/main" id="1" dur="indefinite" restart="never" nodeType="tmRoot"/>
       </p:par>
     </p:tnLst>
   </p:timing>
@@ -13453,7 +13453,7 @@
           <a:p>
             <a:fld id="{6F9CC601-E8A0-4192-9E7A-A0A0BC03434B}" type="datetime1">
               <a:rPr lang="de-DE" smtClean="0"/>
-              <a:t>29.04.2014</a:t>
+              <a:t>08.06.14</a:t>
             </a:fld>
             <a:endParaRPr lang="de-DE" dirty="0"/>
           </a:p>
@@ -13516,13 +13516,13 @@
   <p:clrMapOvr>
     <a:masterClrMapping/>
   </p:clrMapOvr>
-  <p:transition>
+  <p:transition xmlns:p14="http://schemas.microsoft.com/office/powerpoint/2010/main">
     <p:fade/>
   </p:transition>
   <p:timing>
     <p:tnLst>
       <p:par>
-        <p:cTn id="1" dur="indefinite" restart="never" nodeType="tmRoot"/>
+        <p:cTn xmlns:p14="http://schemas.microsoft.com/office/powerpoint/2010/main" id="1" dur="indefinite" restart="never" nodeType="tmRoot"/>
       </p:par>
     </p:tnLst>
   </p:timing>
@@ -13632,7 +13632,7 @@
           <a:p>
             <a:fld id="{1814D2B3-3C92-494B-9F6B-A0CAF197E060}" type="datetime1">
               <a:rPr lang="de-DE" smtClean="0"/>
-              <a:t>29.04.2014</a:t>
+              <a:t>08.06.14</a:t>
             </a:fld>
             <a:endParaRPr lang="de-DE" dirty="0"/>
           </a:p>
@@ -13695,13 +13695,13 @@
   <p:clrMapOvr>
     <a:masterClrMapping/>
   </p:clrMapOvr>
-  <p:transition>
+  <p:transition xmlns:p14="http://schemas.microsoft.com/office/powerpoint/2010/main">
     <p:fade/>
   </p:transition>
   <p:timing>
     <p:tnLst>
       <p:par>
-        <p:cTn id="1" dur="indefinite" restart="never" nodeType="tmRoot"/>
+        <p:cTn xmlns:p14="http://schemas.microsoft.com/office/powerpoint/2010/main" id="1" dur="indefinite" restart="never" nodeType="tmRoot"/>
       </p:par>
     </p:tnLst>
   </p:timing>
@@ -14374,7 +14374,7 @@
           <a:p>
             <a:fld id="{2A272333-F930-450A-9F27-102ED8C1F373}" type="datetime1">
               <a:rPr lang="de-DE" smtClean="0"/>
-              <a:t>29.04.2014</a:t>
+              <a:t>08.06.14</a:t>
             </a:fld>
             <a:endParaRPr lang="de-DE" dirty="0"/>
           </a:p>
@@ -16273,13 +16273,13 @@
   <p:clrMapOvr>
     <a:masterClrMapping/>
   </p:clrMapOvr>
-  <p:transition>
+  <p:transition xmlns:p14="http://schemas.microsoft.com/office/powerpoint/2010/main">
     <p:fade/>
   </p:transition>
   <p:timing>
     <p:tnLst>
       <p:par>
-        <p:cTn id="1" dur="indefinite" restart="never" nodeType="tmRoot"/>
+        <p:cTn xmlns:p14="http://schemas.microsoft.com/office/powerpoint/2010/main" id="1" dur="indefinite" restart="never" nodeType="tmRoot"/>
       </p:par>
     </p:tnLst>
   </p:timing>
@@ -16445,7 +16445,7 @@
           <a:p>
             <a:fld id="{147839C2-A34C-482F-9EEC-87E94E9ADD5D}" type="datetime1">
               <a:rPr lang="de-DE" smtClean="0"/>
-              <a:t>29.04.2014</a:t>
+              <a:t>08.06.14</a:t>
             </a:fld>
             <a:endParaRPr lang="de-DE" dirty="0"/>
           </a:p>
@@ -16508,13 +16508,13 @@
   <p:clrMapOvr>
     <a:masterClrMapping/>
   </p:clrMapOvr>
-  <p:transition>
+  <p:transition xmlns:p14="http://schemas.microsoft.com/office/powerpoint/2010/main">
     <p:fade/>
   </p:transition>
   <p:timing>
     <p:tnLst>
       <p:par>
-        <p:cTn id="1" dur="indefinite" restart="never" nodeType="tmRoot"/>
+        <p:cTn xmlns:p14="http://schemas.microsoft.com/office/powerpoint/2010/main" id="1" dur="indefinite" restart="never" nodeType="tmRoot"/>
       </p:par>
     </p:tnLst>
   </p:timing>
@@ -16624,7 +16624,7 @@
           <a:p>
             <a:fld id="{88FF99E3-ABD1-41AD-A405-5FDBF5390265}" type="datetime1">
               <a:rPr lang="de-DE" smtClean="0"/>
-              <a:t>29.04.2014</a:t>
+              <a:t>08.06.14</a:t>
             </a:fld>
             <a:endParaRPr lang="de-DE" dirty="0"/>
           </a:p>
@@ -16687,13 +16687,13 @@
   <p:clrMapOvr>
     <a:masterClrMapping/>
   </p:clrMapOvr>
-  <p:transition>
+  <p:transition xmlns:p14="http://schemas.microsoft.com/office/powerpoint/2010/main">
     <p:fade/>
   </p:transition>
   <p:timing>
     <p:tnLst>
       <p:par>
-        <p:cTn id="1" dur="indefinite" restart="never" nodeType="tmRoot"/>
+        <p:cTn xmlns:p14="http://schemas.microsoft.com/office/powerpoint/2010/main" id="1" dur="indefinite" restart="never" nodeType="tmRoot"/>
       </p:par>
     </p:tnLst>
   </p:timing>
@@ -16755,7 +16755,54 @@
           <a:bodyPr/>
           <a:lstStyle/>
           <a:p>
-            <a:endParaRPr lang="de-DE"/>
+            <a:r>
+              <a:rPr lang="de-DE" dirty="0" smtClean="0"/>
+              <a:t>Probleme:</a:t>
+            </a:r>
+          </a:p>
+          <a:p>
+            <a:r>
+              <a:rPr lang="de-DE" dirty="0" smtClean="0"/>
+              <a:t>Kann keine null Objekte </a:t>
+            </a:r>
+            <a:r>
+              <a:rPr lang="de-DE" dirty="0" err="1" smtClean="0"/>
+              <a:t>mappen</a:t>
+            </a:r>
+            <a:endParaRPr lang="de-DE" dirty="0" smtClean="0"/>
+          </a:p>
+          <a:p>
+            <a:r>
+              <a:rPr lang="de-DE" dirty="0" smtClean="0"/>
+              <a:t>Kann kein automatisches </a:t>
+            </a:r>
+            <a:r>
+              <a:rPr lang="de-DE" dirty="0" err="1" smtClean="0"/>
+              <a:t>DeepMapping</a:t>
+            </a:r>
+            <a:r>
+              <a:rPr lang="de-DE" dirty="0" smtClean="0"/>
+              <a:t> innerhalb von Listen</a:t>
+            </a:r>
+          </a:p>
+          <a:p>
+            <a:r>
+              <a:rPr lang="de-DE" dirty="0" smtClean="0"/>
+              <a:t>Kann kein </a:t>
+            </a:r>
+            <a:r>
+              <a:rPr lang="de-DE" dirty="0" err="1" smtClean="0"/>
+              <a:t>Enum</a:t>
+            </a:r>
+            <a:r>
+              <a:rPr lang="de-DE" dirty="0" smtClean="0"/>
+              <a:t> Type auf </a:t>
+            </a:r>
+            <a:r>
+              <a:rPr lang="de-DE" smtClean="0"/>
+              <a:t>Vererbung abbilden.</a:t>
+            </a:r>
+            <a:endParaRPr lang="de-DE" dirty="0"/>
           </a:p>
         </p:txBody>
       </p:sp>
@@ -16803,7 +16850,7 @@
           <a:p>
             <a:fld id="{88FF99E3-ABD1-41AD-A405-5FDBF5390265}" type="datetime1">
               <a:rPr lang="de-DE" smtClean="0"/>
-              <a:t>29.04.2014</a:t>
+              <a:t>08.06.14</a:t>
             </a:fld>
             <a:endParaRPr lang="de-DE" dirty="0"/>
           </a:p>
@@ -16866,13 +16913,13 @@
   <p:clrMapOvr>
     <a:masterClrMapping/>
   </p:clrMapOvr>
-  <p:transition>
+  <p:transition xmlns:p14="http://schemas.microsoft.com/office/powerpoint/2010/main">
     <p:fade/>
   </p:transition>
   <p:timing>
     <p:tnLst>
       <p:par>
-        <p:cTn id="1" dur="indefinite" restart="never" nodeType="tmRoot"/>
+        <p:cTn xmlns:p14="http://schemas.microsoft.com/office/powerpoint/2010/main" id="1" dur="indefinite" restart="never" nodeType="tmRoot"/>
       </p:par>
     </p:tnLst>
   </p:timing>
@@ -17545,7 +17592,7 @@
           <a:p>
             <a:fld id="{07F05D96-7809-40F8-92BF-7020E267E7C5}" type="datetime1">
               <a:rPr lang="de-DE" smtClean="0"/>
-              <a:t>29.04.2014</a:t>
+              <a:t>08.06.14</a:t>
             </a:fld>
             <a:endParaRPr lang="de-DE" dirty="0"/>
           </a:p>
@@ -19444,13 +19491,13 @@
   <p:clrMapOvr>
     <a:masterClrMapping/>
   </p:clrMapOvr>
-  <p:transition>
+  <p:transition xmlns:p14="http://schemas.microsoft.com/office/powerpoint/2010/main">
     <p:fade/>
   </p:transition>
   <p:timing>
     <p:tnLst>
       <p:par>
-        <p:cTn id="1" dur="indefinite" restart="never" nodeType="tmRoot"/>
+        <p:cTn xmlns:p14="http://schemas.microsoft.com/office/powerpoint/2010/main" id="1" dur="indefinite" restart="never" nodeType="tmRoot"/>
       </p:par>
     </p:tnLst>
   </p:timing>
@@ -19664,7 +19711,7 @@
           <a:p>
             <a:fld id="{5156B859-72DC-41D4-A75F-9F8F40C2DC5F}" type="datetime1">
               <a:rPr lang="de-DE" smtClean="0"/>
-              <a:t>29.04.2014</a:t>
+              <a:t>08.06.14</a:t>
             </a:fld>
             <a:endParaRPr lang="de-DE" dirty="0"/>
           </a:p>
@@ -19727,13 +19774,13 @@
   <p:clrMapOvr>
     <a:masterClrMapping/>
   </p:clrMapOvr>
-  <p:transition>
+  <p:transition xmlns:p14="http://schemas.microsoft.com/office/powerpoint/2010/main">
     <p:fade/>
   </p:transition>
   <p:timing>
     <p:tnLst>
       <p:par>
-        <p:cTn id="1" dur="indefinite" restart="never" nodeType="tmRoot"/>
+        <p:cTn xmlns:p14="http://schemas.microsoft.com/office/powerpoint/2010/main" id="1" dur="indefinite" restart="never" nodeType="tmRoot"/>
       </p:par>
     </p:tnLst>
   </p:timing>
@@ -19847,7 +19894,7 @@
           <a:p>
             <a:fld id="{E2818308-BC86-4A2C-9F1E-F4F570E8411E}" type="datetime1">
               <a:rPr lang="de-DE" smtClean="0"/>
-              <a:t>29.04.2014</a:t>
+              <a:t>08.06.14</a:t>
             </a:fld>
             <a:endParaRPr lang="de-DE" dirty="0"/>
           </a:p>
@@ -19910,13 +19957,13 @@
   <p:clrMapOvr>
     <a:masterClrMapping/>
   </p:clrMapOvr>
-  <p:transition>
+  <p:transition xmlns:p14="http://schemas.microsoft.com/office/powerpoint/2010/main">
     <p:fade/>
   </p:transition>
   <p:timing>
     <p:tnLst>
       <p:par>
-        <p:cTn id="1" dur="indefinite" restart="never" nodeType="tmRoot"/>
+        <p:cTn xmlns:p14="http://schemas.microsoft.com/office/powerpoint/2010/main" id="1" dur="indefinite" restart="never" nodeType="tmRoot"/>
       </p:par>
     </p:tnLst>
   </p:timing>
@@ -20026,7 +20073,7 @@
           <a:p>
             <a:fld id="{E084A104-F98F-4DE9-8A2D-4AE791961183}" type="datetime1">
               <a:rPr lang="de-DE" smtClean="0"/>
-              <a:t>29.04.2014</a:t>
+              <a:t>08.06.14</a:t>
             </a:fld>
             <a:endParaRPr lang="de-DE" dirty="0"/>
           </a:p>
@@ -20089,13 +20136,13 @@
   <p:clrMapOvr>
     <a:masterClrMapping/>
   </p:clrMapOvr>
-  <p:transition>
+  <p:transition xmlns:p14="http://schemas.microsoft.com/office/powerpoint/2010/main">
     <p:fade/>
   </p:transition>
   <p:timing>
     <p:tnLst>
       <p:par>
-        <p:cTn id="1" dur="indefinite" restart="never" nodeType="tmRoot"/>
+        <p:cTn xmlns:p14="http://schemas.microsoft.com/office/powerpoint/2010/main" id="1" dur="indefinite" restart="never" nodeType="tmRoot"/>
       </p:par>
     </p:tnLst>
   </p:timing>
@@ -20205,7 +20252,7 @@
           <a:p>
             <a:fld id="{E084A104-F98F-4DE9-8A2D-4AE791961183}" type="datetime1">
               <a:rPr lang="de-DE" smtClean="0"/>
-              <a:t>29.04.2014</a:t>
+              <a:t>08.06.14</a:t>
             </a:fld>
             <a:endParaRPr lang="de-DE" dirty="0"/>
           </a:p>
@@ -20268,13 +20315,13 @@
   <p:clrMapOvr>
     <a:masterClrMapping/>
   </p:clrMapOvr>
-  <p:transition>
+  <p:transition xmlns:p14="http://schemas.microsoft.com/office/powerpoint/2010/main">
     <p:fade/>
   </p:transition>
   <p:timing>
     <p:tnLst>
       <p:par>
-        <p:cTn id="1" dur="indefinite" restart="never" nodeType="tmRoot"/>
+        <p:cTn xmlns:p14="http://schemas.microsoft.com/office/powerpoint/2010/main" id="1" dur="indefinite" restart="never" nodeType="tmRoot"/>
       </p:par>
     </p:tnLst>
   </p:timing>
@@ -20947,7 +20994,7 @@
           <a:p>
             <a:fld id="{FD6EEF12-6FD5-4CC6-8DB9-A0E06776301B}" type="datetime1">
               <a:rPr lang="de-DE" smtClean="0"/>
-              <a:t>29.04.2014</a:t>
+              <a:t>08.06.14</a:t>
             </a:fld>
             <a:endParaRPr lang="de-DE" dirty="0"/>
           </a:p>
@@ -22846,13 +22893,13 @@
   <p:clrMapOvr>
     <a:masterClrMapping/>
   </p:clrMapOvr>
-  <p:transition>
+  <p:transition xmlns:p14="http://schemas.microsoft.com/office/powerpoint/2010/main">
     <p:fade/>
   </p:transition>
   <p:timing>
     <p:tnLst>
       <p:par>
-        <p:cTn id="1" dur="indefinite" restart="never" nodeType="tmRoot"/>
+        <p:cTn xmlns:p14="http://schemas.microsoft.com/office/powerpoint/2010/main" id="1" dur="indefinite" restart="never" nodeType="tmRoot"/>
       </p:par>
     </p:tnLst>
   </p:timing>
@@ -22966,7 +23013,7 @@
           <a:p>
             <a:fld id="{2E921785-4189-42D8-A245-C3A88B4F77A7}" type="datetime1">
               <a:rPr lang="de-DE" smtClean="0"/>
-              <a:t>29.04.2014</a:t>
+              <a:t>08.06.14</a:t>
             </a:fld>
             <a:endParaRPr lang="de-DE" dirty="0"/>
           </a:p>
@@ -23029,13 +23076,13 @@
   <p:clrMapOvr>
     <a:masterClrMapping/>
   </p:clrMapOvr>
-  <p:transition>
+  <p:transition xmlns:p14="http://schemas.microsoft.com/office/powerpoint/2010/main">
     <p:fade/>
   </p:transition>
   <p:timing>
     <p:tnLst>
       <p:par>
-        <p:cTn id="1" dur="indefinite" restart="never" nodeType="tmRoot"/>
+        <p:cTn xmlns:p14="http://schemas.microsoft.com/office/powerpoint/2010/main" id="1" dur="indefinite" restart="never" nodeType="tmRoot"/>
       </p:par>
     </p:tnLst>
   </p:timing>
@@ -23145,7 +23192,7 @@
           <a:p>
             <a:fld id="{3781B4C0-0599-474E-ABD9-660DDC0B30F1}" type="datetime1">
               <a:rPr lang="de-DE" smtClean="0"/>
-              <a:t>29.04.2014</a:t>
+              <a:t>08.06.14</a:t>
             </a:fld>
             <a:endParaRPr lang="de-DE" dirty="0"/>
           </a:p>
@@ -23208,13 +23255,13 @@
   <p:clrMapOvr>
     <a:masterClrMapping/>
   </p:clrMapOvr>
-  <p:transition>
+  <p:transition xmlns:p14="http://schemas.microsoft.com/office/powerpoint/2010/main">
     <p:fade/>
   </p:transition>
   <p:timing>
     <p:tnLst>
       <p:par>
-        <p:cTn id="1" dur="indefinite" restart="never" nodeType="tmRoot"/>
+        <p:cTn xmlns:p14="http://schemas.microsoft.com/office/powerpoint/2010/main" id="1" dur="indefinite" restart="never" nodeType="tmRoot"/>
       </p:par>
     </p:tnLst>
   </p:timing>
@@ -23324,7 +23371,7 @@
           <a:p>
             <a:fld id="{3781B4C0-0599-474E-ABD9-660DDC0B30F1}" type="datetime1">
               <a:rPr lang="de-DE" smtClean="0"/>
-              <a:t>29.04.2014</a:t>
+              <a:t>08.06.14</a:t>
             </a:fld>
             <a:endParaRPr lang="de-DE" dirty="0"/>
           </a:p>
@@ -23387,13 +23434,13 @@
   <p:clrMapOvr>
     <a:masterClrMapping/>
   </p:clrMapOvr>
-  <p:transition>
+  <p:transition xmlns:p14="http://schemas.microsoft.com/office/powerpoint/2010/main">
     <p:fade/>
   </p:transition>
   <p:timing>
     <p:tnLst>
       <p:par>
-        <p:cTn id="1" dur="indefinite" restart="never" nodeType="tmRoot"/>
+        <p:cTn xmlns:p14="http://schemas.microsoft.com/office/powerpoint/2010/main" id="1" dur="indefinite" restart="never" nodeType="tmRoot"/>
       </p:par>
     </p:tnLst>
   </p:timing>
@@ -24066,7 +24113,7 @@
           <a:p>
             <a:fld id="{823C4D52-60F5-4A0A-97B2-0D1F37A64DB0}" type="datetime1">
               <a:rPr lang="de-DE" smtClean="0"/>
-              <a:t>29.04.2014</a:t>
+              <a:t>08.06.14</a:t>
             </a:fld>
             <a:endParaRPr lang="de-DE" dirty="0"/>
           </a:p>
@@ -25965,13 +26012,13 @@
   <p:clrMapOvr>
     <a:masterClrMapping/>
   </p:clrMapOvr>
-  <p:transition>
+  <p:transition xmlns:p14="http://schemas.microsoft.com/office/powerpoint/2010/main">
     <p:fade/>
   </p:transition>
   <p:timing>
     <p:tnLst>
       <p:par>
-        <p:cTn id="1" dur="indefinite" restart="never" nodeType="tmRoot"/>
+        <p:cTn xmlns:p14="http://schemas.microsoft.com/office/powerpoint/2010/main" id="1" dur="indefinite" restart="never" nodeType="tmRoot"/>
       </p:par>
     </p:tnLst>
   </p:timing>
@@ -26073,7 +26120,7 @@
           <a:p>
             <a:fld id="{A28B8EE3-6FD4-4AC9-B699-41351B23DCF8}" type="datetime1">
               <a:rPr lang="de-DE" smtClean="0"/>
-              <a:t>29.04.2014</a:t>
+              <a:t>08.06.14</a:t>
             </a:fld>
             <a:endParaRPr lang="de-DE" dirty="0"/>
           </a:p>
@@ -26136,13 +26183,13 @@
   <p:clrMapOvr>
     <a:masterClrMapping/>
   </p:clrMapOvr>
-  <p:transition>
+  <p:transition xmlns:p14="http://schemas.microsoft.com/office/powerpoint/2010/main">
     <p:fade/>
   </p:transition>
   <p:timing>
     <p:tnLst>
       <p:par>
-        <p:cTn id="1" dur="indefinite" restart="never" nodeType="tmRoot"/>
+        <p:cTn xmlns:p14="http://schemas.microsoft.com/office/powerpoint/2010/main" id="1" dur="indefinite" restart="never" nodeType="tmRoot"/>
       </p:par>
     </p:tnLst>
   </p:timing>
@@ -26815,7 +26862,7 @@
           <a:p>
             <a:fld id="{E2E2DEA8-4E9A-45F1-8E4F-72CAC60ACF2B}" type="datetime1">
               <a:rPr lang="de-DE" smtClean="0"/>
-              <a:t>29.04.2014</a:t>
+              <a:t>08.06.14</a:t>
             </a:fld>
             <a:endParaRPr lang="de-DE" dirty="0"/>
           </a:p>
@@ -28714,13 +28761,13 @@
   <p:clrMapOvr>
     <a:masterClrMapping/>
   </p:clrMapOvr>
-  <p:transition>
+  <p:transition xmlns:p14="http://schemas.microsoft.com/office/powerpoint/2010/main">
     <p:fade/>
   </p:transition>
   <p:timing>
     <p:tnLst>
       <p:par>
-        <p:cTn id="1" dur="indefinite" restart="never" nodeType="tmRoot"/>
+        <p:cTn xmlns:p14="http://schemas.microsoft.com/office/powerpoint/2010/main" id="1" dur="indefinite" restart="never" nodeType="tmRoot"/>
       </p:par>
     </p:tnLst>
   </p:timing>
@@ -28930,7 +28977,7 @@
           <a:p>
             <a:fld id="{259B0966-77E1-4023-AC3F-8A234A9A841E}" type="datetime1">
               <a:rPr lang="de-DE" smtClean="0"/>
-              <a:t>29.04.2014</a:t>
+              <a:t>08.06.14</a:t>
             </a:fld>
             <a:endParaRPr lang="de-DE" dirty="0"/>
           </a:p>
@@ -28993,13 +29040,13 @@
   <p:clrMapOvr>
     <a:masterClrMapping/>
   </p:clrMapOvr>
-  <p:transition>
+  <p:transition xmlns:p14="http://schemas.microsoft.com/office/powerpoint/2010/main">
     <p:fade/>
   </p:transition>
   <p:timing>
     <p:tnLst>
       <p:par>
-        <p:cTn id="1" dur="indefinite" restart="never" nodeType="tmRoot"/>
+        <p:cTn xmlns:p14="http://schemas.microsoft.com/office/powerpoint/2010/main" id="1" dur="indefinite" restart="never" nodeType="tmRoot"/>
       </p:par>
     </p:tnLst>
   </p:timing>
@@ -29105,7 +29152,7 @@
           <a:p>
             <a:fld id="{4EE847A6-8CB8-46A2-8F15-85A4E686AF81}" type="datetime1">
               <a:rPr lang="de-DE" smtClean="0"/>
-              <a:t>29.04.2014</a:t>
+              <a:t>08.06.14</a:t>
             </a:fld>
             <a:endParaRPr lang="de-DE" dirty="0"/>
           </a:p>
@@ -29168,13 +29215,13 @@
   <p:clrMapOvr>
     <a:masterClrMapping/>
   </p:clrMapOvr>
-  <p:transition>
+  <p:transition xmlns:p14="http://schemas.microsoft.com/office/powerpoint/2010/main">
     <p:fade/>
   </p:transition>
   <p:timing>
     <p:tnLst>
       <p:par>
-        <p:cTn id="1" dur="indefinite" restart="never" nodeType="tmRoot"/>
+        <p:cTn xmlns:p14="http://schemas.microsoft.com/office/powerpoint/2010/main" id="1" dur="indefinite" restart="never" nodeType="tmRoot"/>
       </p:par>
     </p:tnLst>
   </p:timing>
@@ -29847,7 +29894,7 @@
           <a:p>
             <a:fld id="{FA7E8C41-564D-4919-ACED-ED650F2402E2}" type="datetime1">
               <a:rPr lang="de-DE" smtClean="0"/>
-              <a:t>29.04.2014</a:t>
+              <a:t>08.06.14</a:t>
             </a:fld>
             <a:endParaRPr lang="de-DE" dirty="0"/>
           </a:p>
@@ -31746,13 +31793,13 @@
   <p:clrMapOvr>
     <a:masterClrMapping/>
   </p:clrMapOvr>
-  <p:transition>
+  <p:transition xmlns:p14="http://schemas.microsoft.com/office/powerpoint/2010/main">
     <p:fade/>
   </p:transition>
   <p:timing>
     <p:tnLst>
       <p:par>
-        <p:cTn id="1" dur="indefinite" restart="never" nodeType="tmRoot"/>
+        <p:cTn xmlns:p14="http://schemas.microsoft.com/office/powerpoint/2010/main" id="1" dur="indefinite" restart="never" nodeType="tmRoot"/>
       </p:par>
     </p:tnLst>
   </p:timing>
@@ -32425,7 +32472,7 @@
           <a:p>
             <a:fld id="{B0926119-4126-47AD-BA8F-407809864C66}" type="datetime1">
               <a:rPr lang="de-DE" smtClean="0"/>
-              <a:t>29.04.2014</a:t>
+              <a:t>08.06.14</a:t>
             </a:fld>
             <a:endParaRPr lang="de-DE" dirty="0"/>
           </a:p>
@@ -34324,13 +34371,13 @@
   <p:clrMapOvr>
     <a:masterClrMapping/>
   </p:clrMapOvr>
-  <p:transition>
+  <p:transition xmlns:p14="http://schemas.microsoft.com/office/powerpoint/2010/main">
     <p:fade/>
   </p:transition>
   <p:timing>
     <p:tnLst>
       <p:par>
-        <p:cTn id="1" dur="indefinite" restart="never" nodeType="tmRoot"/>
+        <p:cTn xmlns:p14="http://schemas.microsoft.com/office/powerpoint/2010/main" id="1" dur="indefinite" restart="never" nodeType="tmRoot"/>
       </p:par>
     </p:tnLst>
   </p:timing>
@@ -34458,7 +34505,7 @@
           <a:p>
             <a:fld id="{51E5E37F-4CF4-4734-BC7A-5A465BBB5452}" type="datetime1">
               <a:rPr lang="de-DE" smtClean="0"/>
-              <a:t>29.04.2014</a:t>
+              <a:t>08.06.14</a:t>
             </a:fld>
             <a:endParaRPr lang="de-DE" dirty="0"/>
           </a:p>
@@ -34521,13 +34568,13 @@
   <p:clrMapOvr>
     <a:masterClrMapping/>
   </p:clrMapOvr>
-  <p:transition>
+  <p:transition xmlns:p14="http://schemas.microsoft.com/office/powerpoint/2010/main">
     <p:fade/>
   </p:transition>
   <p:timing>
     <p:tnLst>
       <p:par>
-        <p:cTn id="1" dur="indefinite" restart="never" nodeType="tmRoot"/>
+        <p:cTn xmlns:p14="http://schemas.microsoft.com/office/powerpoint/2010/main" id="1" dur="indefinite" restart="never" nodeType="tmRoot"/>
       </p:par>
     </p:tnLst>
   </p:timing>
@@ -34655,7 +34702,7 @@
           <a:p>
             <a:fld id="{51E5E37F-4CF4-4734-BC7A-5A465BBB5452}" type="datetime1">
               <a:rPr lang="de-DE" smtClean="0"/>
-              <a:t>29.04.2014</a:t>
+              <a:t>08.06.14</a:t>
             </a:fld>
             <a:endParaRPr lang="de-DE" dirty="0"/>
           </a:p>
@@ -34756,13 +34803,13 @@
   <p:clrMapOvr>
     <a:masterClrMapping/>
   </p:clrMapOvr>
-  <p:transition>
+  <p:transition xmlns:p14="http://schemas.microsoft.com/office/powerpoint/2010/main">
     <p:fade/>
   </p:transition>
   <p:timing>
     <p:tnLst>
       <p:par>
-        <p:cTn id="1" dur="indefinite" restart="never" nodeType="tmRoot"/>
+        <p:cTn xmlns:p14="http://schemas.microsoft.com/office/powerpoint/2010/main" id="1" dur="indefinite" restart="never" nodeType="tmRoot"/>
       </p:par>
     </p:tnLst>
   </p:timing>
@@ -34876,7 +34923,7 @@
           <a:p>
             <a:fld id="{447DD63D-B234-4936-A1E9-BF6082DE8AE5}" type="datetime1">
               <a:rPr lang="de-DE" smtClean="0"/>
-              <a:t>29.04.2014</a:t>
+              <a:t>08.06.14</a:t>
             </a:fld>
             <a:endParaRPr lang="de-DE" dirty="0"/>
           </a:p>
@@ -35008,11 +35055,7 @@
             </a:pPr>
             <a:r>
               <a:rPr lang="de-DE" sz="1400" dirty="0" smtClean="0"/>
-              <a:t>… stabilen </a:t>
-            </a:r>
-            <a:r>
-              <a:rPr lang="de-DE" sz="1400" dirty="0" smtClean="0"/>
-              <a:t>Schnittstellen</a:t>
+              <a:t>… stabilen Schnittstellen</a:t>
             </a:r>
           </a:p>
           <a:p>
@@ -35028,11 +35071,7 @@
             </a:pPr>
             <a:r>
               <a:rPr lang="de-DE" sz="1400" dirty="0" smtClean="0"/>
-              <a:t>… Annotationen</a:t>
-            </a:r>
-            <a:r>
-              <a:rPr lang="de-DE" sz="1400" dirty="0" smtClean="0"/>
-              <a:t>, die der Konsument nicht kennen muss/soll</a:t>
+              <a:t>… Annotationen, die der Konsument nicht kennen muss/soll</a:t>
             </a:r>
           </a:p>
           <a:p>
@@ -35048,11 +35087,7 @@
             </a:pPr>
             <a:r>
               <a:rPr lang="de-DE" sz="1400" dirty="0" smtClean="0"/>
-              <a:t>… „</a:t>
-            </a:r>
-            <a:r>
-              <a:rPr lang="de-DE" sz="1400" dirty="0" smtClean="0"/>
-              <a:t>geheimen“ Attributen der </a:t>
+              <a:t>… „geheimen“ Attributen der </a:t>
             </a:r>
             <a:r>
               <a:rPr lang="de-DE" sz="1400" dirty="0" err="1" smtClean="0"/>
@@ -35135,13 +35170,13 @@
   <p:clrMapOvr>
     <a:masterClrMapping/>
   </p:clrMapOvr>
-  <p:transition>
+  <p:transition xmlns:p14="http://schemas.microsoft.com/office/powerpoint/2010/main">
     <p:fade/>
   </p:transition>
   <p:timing>
     <p:tnLst>
       <p:par>
-        <p:cTn id="1" dur="indefinite" restart="never" nodeType="tmRoot"/>
+        <p:cTn xmlns:p14="http://schemas.microsoft.com/office/powerpoint/2010/main" id="1" dur="indefinite" restart="never" nodeType="tmRoot"/>
       </p:par>
     </p:tnLst>
   </p:timing>
@@ -35259,7 +35294,7 @@
           <a:p>
             <a:fld id="{9B55D62D-7FBE-4C67-9194-E2B7522AB6A0}" type="datetime1">
               <a:rPr lang="de-DE" smtClean="0"/>
-              <a:t>29.04.2014</a:t>
+              <a:t>08.06.14</a:t>
             </a:fld>
             <a:endParaRPr lang="de-DE" dirty="0"/>
           </a:p>
@@ -35879,13 +35914,13 @@
   <p:clrMapOvr>
     <a:masterClrMapping/>
   </p:clrMapOvr>
-  <p:transition>
+  <p:transition xmlns:p14="http://schemas.microsoft.com/office/powerpoint/2010/main">
     <p:fade/>
   </p:transition>
   <p:timing>
     <p:tnLst>
       <p:par>
-        <p:cTn id="1" dur="indefinite" restart="never" nodeType="tmRoot"/>
+        <p:cTn xmlns:p14="http://schemas.microsoft.com/office/powerpoint/2010/main" id="1" dur="indefinite" restart="never" nodeType="tmRoot"/>
       </p:par>
     </p:tnLst>
   </p:timing>
@@ -36003,7 +36038,7 @@
           <a:p>
             <a:fld id="{9B55D62D-7FBE-4C67-9194-E2B7522AB6A0}" type="datetime1">
               <a:rPr lang="de-DE" smtClean="0"/>
-              <a:t>29.04.2014</a:t>
+              <a:t>08.06.14</a:t>
             </a:fld>
             <a:endParaRPr lang="de-DE" dirty="0"/>
           </a:p>
@@ -36707,13 +36742,13 @@
   <p:clrMapOvr>
     <a:masterClrMapping/>
   </p:clrMapOvr>
-  <p:transition>
+  <p:transition xmlns:p14="http://schemas.microsoft.com/office/powerpoint/2010/main">
     <p:fade/>
   </p:transition>
   <p:timing>
     <p:tnLst>
       <p:par>
-        <p:cTn id="1" dur="indefinite" restart="never" nodeType="tmRoot"/>
+        <p:cTn xmlns:p14="http://schemas.microsoft.com/office/powerpoint/2010/main" id="1" dur="indefinite" restart="never" nodeType="tmRoot"/>
       </p:par>
     </p:tnLst>
   </p:timing>

</xml_diff>